<commit_message>
Fixed Logo transparency Issue
</commit_message>
<xml_diff>
--- a/Blog Images/StatExchange Logo.pptx
+++ b/Blog Images/StatExchange Logo.pptx
@@ -263,7 +263,7 @@
           <a:p>
             <a:fld id="{13B5BB1C-6AF0-496C-91AE-7DCFDA61B447}" type="datetimeFigureOut">
               <a:rPr lang="en-US" smtClean="0"/>
-              <a:t>3/5/2020</a:t>
+              <a:t>3/10/2020</a:t>
             </a:fld>
             <a:endParaRPr lang="en-US"/>
           </a:p>
@@ -461,7 +461,7 @@
           <a:p>
             <a:fld id="{13B5BB1C-6AF0-496C-91AE-7DCFDA61B447}" type="datetimeFigureOut">
               <a:rPr lang="en-US" smtClean="0"/>
-              <a:t>3/5/2020</a:t>
+              <a:t>3/10/2020</a:t>
             </a:fld>
             <a:endParaRPr lang="en-US"/>
           </a:p>
@@ -669,7 +669,7 @@
           <a:p>
             <a:fld id="{13B5BB1C-6AF0-496C-91AE-7DCFDA61B447}" type="datetimeFigureOut">
               <a:rPr lang="en-US" smtClean="0"/>
-              <a:t>3/5/2020</a:t>
+              <a:t>3/10/2020</a:t>
             </a:fld>
             <a:endParaRPr lang="en-US"/>
           </a:p>
@@ -867,7 +867,7 @@
           <a:p>
             <a:fld id="{13B5BB1C-6AF0-496C-91AE-7DCFDA61B447}" type="datetimeFigureOut">
               <a:rPr lang="en-US" smtClean="0"/>
-              <a:t>3/5/2020</a:t>
+              <a:t>3/10/2020</a:t>
             </a:fld>
             <a:endParaRPr lang="en-US"/>
           </a:p>
@@ -1142,7 +1142,7 @@
           <a:p>
             <a:fld id="{13B5BB1C-6AF0-496C-91AE-7DCFDA61B447}" type="datetimeFigureOut">
               <a:rPr lang="en-US" smtClean="0"/>
-              <a:t>3/5/2020</a:t>
+              <a:t>3/10/2020</a:t>
             </a:fld>
             <a:endParaRPr lang="en-US"/>
           </a:p>
@@ -1407,7 +1407,7 @@
           <a:p>
             <a:fld id="{13B5BB1C-6AF0-496C-91AE-7DCFDA61B447}" type="datetimeFigureOut">
               <a:rPr lang="en-US" smtClean="0"/>
-              <a:t>3/5/2020</a:t>
+              <a:t>3/10/2020</a:t>
             </a:fld>
             <a:endParaRPr lang="en-US"/>
           </a:p>
@@ -1819,7 +1819,7 @@
           <a:p>
             <a:fld id="{13B5BB1C-6AF0-496C-91AE-7DCFDA61B447}" type="datetimeFigureOut">
               <a:rPr lang="en-US" smtClean="0"/>
-              <a:t>3/5/2020</a:t>
+              <a:t>3/10/2020</a:t>
             </a:fld>
             <a:endParaRPr lang="en-US"/>
           </a:p>
@@ -1960,7 +1960,7 @@
           <a:p>
             <a:fld id="{13B5BB1C-6AF0-496C-91AE-7DCFDA61B447}" type="datetimeFigureOut">
               <a:rPr lang="en-US" smtClean="0"/>
-              <a:t>3/5/2020</a:t>
+              <a:t>3/10/2020</a:t>
             </a:fld>
             <a:endParaRPr lang="en-US"/>
           </a:p>
@@ -2073,7 +2073,7 @@
           <a:p>
             <a:fld id="{13B5BB1C-6AF0-496C-91AE-7DCFDA61B447}" type="datetimeFigureOut">
               <a:rPr lang="en-US" smtClean="0"/>
-              <a:t>3/5/2020</a:t>
+              <a:t>3/10/2020</a:t>
             </a:fld>
             <a:endParaRPr lang="en-US"/>
           </a:p>
@@ -2384,7 +2384,7 @@
           <a:p>
             <a:fld id="{13B5BB1C-6AF0-496C-91AE-7DCFDA61B447}" type="datetimeFigureOut">
               <a:rPr lang="en-US" smtClean="0"/>
-              <a:t>3/5/2020</a:t>
+              <a:t>3/10/2020</a:t>
             </a:fld>
             <a:endParaRPr lang="en-US"/>
           </a:p>
@@ -2672,7 +2672,7 @@
           <a:p>
             <a:fld id="{13B5BB1C-6AF0-496C-91AE-7DCFDA61B447}" type="datetimeFigureOut">
               <a:rPr lang="en-US" smtClean="0"/>
-              <a:t>3/5/2020</a:t>
+              <a:t>3/10/2020</a:t>
             </a:fld>
             <a:endParaRPr lang="en-US"/>
           </a:p>
@@ -2913,7 +2913,7 @@
           <a:p>
             <a:fld id="{13B5BB1C-6AF0-496C-91AE-7DCFDA61B447}" type="datetimeFigureOut">
               <a:rPr lang="en-US" smtClean="0"/>
-              <a:t>3/5/2020</a:t>
+              <a:t>3/10/2020</a:t>
             </a:fld>
             <a:endParaRPr lang="en-US"/>
           </a:p>
@@ -3345,7 +3345,18 @@
           <p:nvPr/>
         </p:nvPicPr>
         <p:blipFill rotWithShape="1">
-          <a:blip r:embed="rId2"/>
+          <a:blip r:embed="rId2">
+            <a:clrChange>
+              <a:clrFrom>
+                <a:srgbClr val="FFFFFF"/>
+              </a:clrFrom>
+              <a:clrTo>
+                <a:srgbClr val="FFFFFF">
+                  <a:alpha val="0"/>
+                </a:srgbClr>
+              </a:clrTo>
+            </a:clrChange>
+          </a:blip>
           <a:srcRect l="13402" t="15662" r="6104" b="17222"/>
           <a:stretch/>
         </p:blipFill>

</xml_diff>